<commit_message>
changes to section order and added comments
</commit_message>
<xml_diff>
--- a/figs/Framework.pptx
+++ b/figs/Framework.pptx
@@ -259,7 +259,7 @@
           <a:p>
             <a:fld id="{C53A5CDC-ECDD-0344-BD29-1016516BEA47}" type="datetimeFigureOut">
               <a:rPr lang="en-US" smtClean="0"/>
-              <a:t>4/21/19</a:t>
+              <a:t>4/28/19</a:t>
             </a:fld>
             <a:endParaRPr lang="en-US"/>
           </a:p>
@@ -457,7 +457,7 @@
           <a:p>
             <a:fld id="{C53A5CDC-ECDD-0344-BD29-1016516BEA47}" type="datetimeFigureOut">
               <a:rPr lang="en-US" smtClean="0"/>
-              <a:t>4/21/19</a:t>
+              <a:t>4/28/19</a:t>
             </a:fld>
             <a:endParaRPr lang="en-US"/>
           </a:p>
@@ -665,7 +665,7 @@
           <a:p>
             <a:fld id="{C53A5CDC-ECDD-0344-BD29-1016516BEA47}" type="datetimeFigureOut">
               <a:rPr lang="en-US" smtClean="0"/>
-              <a:t>4/21/19</a:t>
+              <a:t>4/28/19</a:t>
             </a:fld>
             <a:endParaRPr lang="en-US"/>
           </a:p>
@@ -863,7 +863,7 @@
           <a:p>
             <a:fld id="{C53A5CDC-ECDD-0344-BD29-1016516BEA47}" type="datetimeFigureOut">
               <a:rPr lang="en-US" smtClean="0"/>
-              <a:t>4/21/19</a:t>
+              <a:t>4/28/19</a:t>
             </a:fld>
             <a:endParaRPr lang="en-US"/>
           </a:p>
@@ -1138,7 +1138,7 @@
           <a:p>
             <a:fld id="{C53A5CDC-ECDD-0344-BD29-1016516BEA47}" type="datetimeFigureOut">
               <a:rPr lang="en-US" smtClean="0"/>
-              <a:t>4/21/19</a:t>
+              <a:t>4/28/19</a:t>
             </a:fld>
             <a:endParaRPr lang="en-US"/>
           </a:p>
@@ -1403,7 +1403,7 @@
           <a:p>
             <a:fld id="{C53A5CDC-ECDD-0344-BD29-1016516BEA47}" type="datetimeFigureOut">
               <a:rPr lang="en-US" smtClean="0"/>
-              <a:t>4/21/19</a:t>
+              <a:t>4/28/19</a:t>
             </a:fld>
             <a:endParaRPr lang="en-US"/>
           </a:p>
@@ -1815,7 +1815,7 @@
           <a:p>
             <a:fld id="{C53A5CDC-ECDD-0344-BD29-1016516BEA47}" type="datetimeFigureOut">
               <a:rPr lang="en-US" smtClean="0"/>
-              <a:t>4/21/19</a:t>
+              <a:t>4/28/19</a:t>
             </a:fld>
             <a:endParaRPr lang="en-US"/>
           </a:p>
@@ -1956,7 +1956,7 @@
           <a:p>
             <a:fld id="{C53A5CDC-ECDD-0344-BD29-1016516BEA47}" type="datetimeFigureOut">
               <a:rPr lang="en-US" smtClean="0"/>
-              <a:t>4/21/19</a:t>
+              <a:t>4/28/19</a:t>
             </a:fld>
             <a:endParaRPr lang="en-US"/>
           </a:p>
@@ -2069,7 +2069,7 @@
           <a:p>
             <a:fld id="{C53A5CDC-ECDD-0344-BD29-1016516BEA47}" type="datetimeFigureOut">
               <a:rPr lang="en-US" smtClean="0"/>
-              <a:t>4/21/19</a:t>
+              <a:t>4/28/19</a:t>
             </a:fld>
             <a:endParaRPr lang="en-US"/>
           </a:p>
@@ -2380,7 +2380,7 @@
           <a:p>
             <a:fld id="{C53A5CDC-ECDD-0344-BD29-1016516BEA47}" type="datetimeFigureOut">
               <a:rPr lang="en-US" smtClean="0"/>
-              <a:t>4/21/19</a:t>
+              <a:t>4/28/19</a:t>
             </a:fld>
             <a:endParaRPr lang="en-US"/>
           </a:p>
@@ -2668,7 +2668,7 @@
           <a:p>
             <a:fld id="{C53A5CDC-ECDD-0344-BD29-1016516BEA47}" type="datetimeFigureOut">
               <a:rPr lang="en-US" smtClean="0"/>
-              <a:t>4/21/19</a:t>
+              <a:t>4/28/19</a:t>
             </a:fld>
             <a:endParaRPr lang="en-US"/>
           </a:p>
@@ -2909,7 +2909,7 @@
           <a:p>
             <a:fld id="{C53A5CDC-ECDD-0344-BD29-1016516BEA47}" type="datetimeFigureOut">
               <a:rPr lang="en-US" smtClean="0"/>
-              <a:t>4/21/19</a:t>
+              <a:t>4/28/19</a:t>
             </a:fld>
             <a:endParaRPr lang="en-US"/>
           </a:p>
@@ -3357,8 +3357,8 @@
           </a:prstGeom>
         </p:spPr>
       </p:pic>
-      <mc:AlternateContent xmlns:mc="http://schemas.openxmlformats.org/markup-compatibility/2006">
-        <mc:Choice xmlns:a14="http://schemas.microsoft.com/office/drawing/2010/main" Requires="a14">
+      <mc:AlternateContent xmlns:mc="http://schemas.openxmlformats.org/markup-compatibility/2006" xmlns:a14="http://schemas.microsoft.com/office/drawing/2010/main">
+        <mc:Choice Requires="a14">
           <p:sp>
             <p:nvSpPr>
               <p:cNvPr id="35" name="TextBox 34">
@@ -3420,7 +3420,7 @@
             </p:txBody>
           </p:sp>
         </mc:Choice>
-        <mc:Fallback>
+        <mc:Fallback xmlns="">
           <p:sp>
             <p:nvSpPr>
               <p:cNvPr id="35" name="TextBox 34">
@@ -3480,9 +3480,9 @@
         <p:grpSpPr>
           <a:xfrm>
             <a:off x="3351772" y="2096832"/>
-            <a:ext cx="1760423" cy="2144608"/>
+            <a:ext cx="1760423" cy="2136872"/>
             <a:chOff x="2474392" y="2158552"/>
-            <a:chExt cx="1777895" cy="2100606"/>
+            <a:chExt cx="1777895" cy="2093028"/>
           </a:xfrm>
         </p:grpSpPr>
         <p:pic>
@@ -3659,8 +3659,8 @@
             </p:sp>
           </mc:Fallback>
         </mc:AlternateContent>
-        <mc:AlternateContent xmlns:mc="http://schemas.openxmlformats.org/markup-compatibility/2006" xmlns:a14="http://schemas.microsoft.com/office/drawing/2010/main">
-          <mc:Choice Requires="a14">
+        <mc:AlternateContent xmlns:mc="http://schemas.openxmlformats.org/markup-compatibility/2006">
+          <mc:Choice xmlns:a14="http://schemas.microsoft.com/office/drawing/2010/main" Requires="a14">
             <p:sp>
               <p:nvSpPr>
                 <p:cNvPr id="36" name="TextBox 35">
@@ -3676,7 +3676,7 @@
               <p:spPr>
                 <a:xfrm>
                   <a:off x="2509378" y="3889826"/>
-                  <a:ext cx="1636880" cy="369332"/>
+                  <a:ext cx="1636880" cy="361754"/>
                 </a:xfrm>
                 <a:prstGeom prst="rect">
                   <a:avLst/>
@@ -3714,7 +3714,7 @@
                             <a:rPr lang="en-US" b="1" i="1" smtClean="0">
                               <a:latin typeface="Cambria Math" panose="02040503050406030204" pitchFamily="18" charset="0"/>
                             </a:rPr>
-                            <m:t>𝒅</m:t>
+                            <m:t>𝝍</m:t>
                           </m:r>
                         </m:e>
                         <m:sub>
@@ -3751,7 +3751,7 @@
               </p:txBody>
             </p:sp>
           </mc:Choice>
-          <mc:Fallback xmlns="">
+          <mc:Fallback>
             <p:sp>
               <p:nvSpPr>
                 <p:cNvPr id="36" name="TextBox 35">
@@ -3769,7 +3769,7 @@
               <p:spPr>
                 <a:xfrm>
                   <a:off x="2509378" y="3889826"/>
-                  <a:ext cx="1636880" cy="369332"/>
+                  <a:ext cx="1636880" cy="361754"/>
                 </a:xfrm>
                 <a:prstGeom prst="rect">
                   <a:avLst/>
@@ -3777,7 +3777,7 @@
                 <a:blipFill>
                   <a:blip r:embed="rId6"/>
                   <a:stretch>
-                    <a:fillRect l="-3125" t="-6452" b="-22581"/>
+                    <a:fillRect l="-3125" t="-6667" b="-26667"/>
                   </a:stretch>
                 </a:blipFill>
               </p:spPr>
@@ -3853,8 +3853,8 @@
             </a:prstGeom>
           </p:spPr>
         </p:pic>
-        <mc:AlternateContent xmlns:mc="http://schemas.openxmlformats.org/markup-compatibility/2006" xmlns:a14="http://schemas.microsoft.com/office/drawing/2010/main">
-          <mc:Choice Requires="a14">
+        <mc:AlternateContent xmlns:mc="http://schemas.openxmlformats.org/markup-compatibility/2006">
+          <mc:Choice xmlns:a14="http://schemas.microsoft.com/office/drawing/2010/main" Requires="a14">
             <p:sp>
               <p:nvSpPr>
                 <p:cNvPr id="30" name="TextBox 29">
@@ -3898,10 +3898,13 @@
                   <a14:m>
                     <m:oMath xmlns:m="http://schemas.openxmlformats.org/officeDocument/2006/math">
                       <m:r>
-                        <a:rPr lang="en-US" b="0" i="1" smtClean="0">
+                        <m:rPr>
+                          <m:sty m:val="p"/>
+                        </m:rPr>
+                        <a:rPr lang="en-US" b="0" i="0" smtClean="0">
                           <a:latin typeface="Cambria Math" panose="02040503050406030204" pitchFamily="18" charset="0"/>
                         </a:rPr>
-                        <m:t>𝑓</m:t>
+                        <m:t>x</m:t>
                       </m:r>
                       <m:d>
                         <m:dPr>
@@ -3927,7 +3930,7 @@
               </p:txBody>
             </p:sp>
           </mc:Choice>
-          <mc:Fallback xmlns="">
+          <mc:Fallback>
             <p:sp>
               <p:nvSpPr>
                 <p:cNvPr id="30" name="TextBox 29">
@@ -4282,8 +4285,8 @@
             </p:sp>
           </mc:Fallback>
         </mc:AlternateContent>
-        <mc:AlternateContent xmlns:mc="http://schemas.openxmlformats.org/markup-compatibility/2006" xmlns:a14="http://schemas.microsoft.com/office/drawing/2010/main">
-          <mc:Choice Requires="a14">
+        <mc:AlternateContent xmlns:mc="http://schemas.openxmlformats.org/markup-compatibility/2006">
+          <mc:Choice xmlns:a14="http://schemas.microsoft.com/office/drawing/2010/main" Requires="a14">
             <p:sp>
               <p:nvSpPr>
                 <p:cNvPr id="47" name="TextBox 46">
@@ -4337,7 +4340,7 @@
                             <a:rPr lang="en-US" b="1" i="1" smtClean="0">
                               <a:latin typeface="Cambria Math" panose="02040503050406030204" pitchFamily="18" charset="0"/>
                             </a:rPr>
-                            <m:t>𝒅</m:t>
+                            <m:t>𝝍</m:t>
                           </m:r>
                         </m:e>
                         <m:sub>
@@ -4374,7 +4377,7 @@
               </p:txBody>
             </p:sp>
           </mc:Choice>
-          <mc:Fallback xmlns="">
+          <mc:Fallback>
             <p:sp>
               <p:nvSpPr>
                 <p:cNvPr id="47" name="TextBox 46">
@@ -4614,8 +4617,8 @@
             </p:sp>
           </mc:Fallback>
         </mc:AlternateContent>
-        <mc:AlternateContent xmlns:mc="http://schemas.openxmlformats.org/markup-compatibility/2006" xmlns:a14="http://schemas.microsoft.com/office/drawing/2010/main">
-          <mc:Choice Requires="a14">
+        <mc:AlternateContent xmlns:mc="http://schemas.openxmlformats.org/markup-compatibility/2006">
+          <mc:Choice xmlns:a14="http://schemas.microsoft.com/office/drawing/2010/main" Requires="a14">
             <p:sp>
               <p:nvSpPr>
                 <p:cNvPr id="51" name="TextBox 50">
@@ -4669,7 +4672,7 @@
                             <a:rPr lang="en-US" b="1" i="1" smtClean="0">
                               <a:latin typeface="Cambria Math" panose="02040503050406030204" pitchFamily="18" charset="0"/>
                             </a:rPr>
-                            <m:t>𝒅</m:t>
+                            <m:t>𝝍</m:t>
                           </m:r>
                         </m:e>
                         <m:sub>
@@ -4706,7 +4709,7 @@
               </p:txBody>
             </p:sp>
           </mc:Choice>
-          <mc:Fallback xmlns="">
+          <mc:Fallback>
             <p:sp>
               <p:nvSpPr>
                 <p:cNvPr id="51" name="TextBox 50">
@@ -4732,7 +4735,7 @@
                 <a:blipFill>
                   <a:blip r:embed="rId14"/>
                   <a:stretch>
-                    <a:fillRect l="-3101" t="-3333" b="-26667"/>
+                    <a:fillRect l="-2326" t="-3333" b="-26667"/>
                   </a:stretch>
                 </a:blipFill>
               </p:spPr>

</xml_diff>